<commit_message>
Updated Part 6 slide deck
</commit_message>
<xml_diff>
--- a/Deliverables - Raw/08_MovieMining_Part6.pptx
+++ b/Deliverables - Raw/08_MovieMining_Part6.pptx
@@ -15,23 +15,24 @@
     <p:sldId id="260" r:id="rId10"/>
     <p:sldId id="261" r:id="rId11"/>
     <p:sldId id="262" r:id="rId12"/>
+    <p:sldId id="263" r:id="rId13"/>
   </p:sldIdLst>
   <p:sldSz cy="5143500" cx="9144000"/>
   <p:notesSz cx="6858000" cy="9144000"/>
   <p:embeddedFontLst>
     <p:embeddedFont>
       <p:font typeface="Montserrat"/>
-      <p:regular r:id="rId13"/>
-      <p:bold r:id="rId14"/>
-      <p:italic r:id="rId15"/>
-      <p:boldItalic r:id="rId16"/>
+      <p:regular r:id="rId14"/>
+      <p:bold r:id="rId15"/>
+      <p:italic r:id="rId16"/>
+      <p:boldItalic r:id="rId17"/>
     </p:embeddedFont>
     <p:embeddedFont>
       <p:font typeface="Lato"/>
-      <p:regular r:id="rId17"/>
-      <p:bold r:id="rId18"/>
-      <p:italic r:id="rId19"/>
-      <p:boldItalic r:id="rId20"/>
+      <p:regular r:id="rId18"/>
+      <p:bold r:id="rId19"/>
+      <p:italic r:id="rId20"/>
+      <p:boldItalic r:id="rId21"/>
     </p:embeddedFont>
   </p:embeddedFontLst>
   <p:defaultTextStyle>
@@ -1222,7 +1223,7 @@
       </p:grpSpPr>
       <p:sp>
         <p:nvSpPr>
-          <p:cNvPr id="161" name="Google Shape;161;g2fa9c43fd8d_0_145:notes"/>
+          <p:cNvPr id="161" name="Google Shape;161;g31a943b0043_0_0:notes"/>
           <p:cNvSpPr/>
           <p:nvPr>
             <p:ph idx="2" type="sldImg"/>
@@ -1257,7 +1258,7 @@
       </p:sp>
       <p:sp>
         <p:nvSpPr>
-          <p:cNvPr id="162" name="Google Shape;162;g2fa9c43fd8d_0_145:notes"/>
+          <p:cNvPr id="162" name="Google Shape;162;g31a943b0043_0_0:notes"/>
           <p:cNvSpPr txBox="1"/>
           <p:nvPr>
             <p:ph idx="1" type="body"/>
@@ -1321,7 +1322,7 @@
       </p:grpSpPr>
       <p:sp>
         <p:nvSpPr>
-          <p:cNvPr id="167" name="Google Shape;167;g2fa9c43fd8d_0_150:notes"/>
+          <p:cNvPr id="167" name="Google Shape;167;g2fa9c43fd8d_0_145:notes"/>
           <p:cNvSpPr/>
           <p:nvPr>
             <p:ph idx="2" type="sldImg"/>
@@ -1356,7 +1357,106 @@
       </p:sp>
       <p:sp>
         <p:nvSpPr>
-          <p:cNvPr id="168" name="Google Shape;168;g2fa9c43fd8d_0_150:notes"/>
+          <p:cNvPr id="168" name="Google Shape;168;g2fa9c43fd8d_0_145:notes"/>
+          <p:cNvSpPr txBox="1"/>
+          <p:nvPr>
+            <p:ph idx="1" type="body"/>
+          </p:nvPr>
+        </p:nvSpPr>
+        <p:spPr>
+          <a:xfrm>
+            <a:off x="685800" y="4343400"/>
+            <a:ext cx="5486400" cy="4114800"/>
+          </a:xfrm>
+          <a:prstGeom prst="rect">
+            <a:avLst/>
+          </a:prstGeom>
+        </p:spPr>
+        <p:txBody>
+          <a:bodyPr anchorCtr="0" anchor="t" bIns="91425" lIns="91425" spcFirstLastPara="1" rIns="91425" wrap="square" tIns="91425">
+            <a:noAutofit/>
+          </a:bodyPr>
+          <a:lstStyle/>
+          <a:p>
+            <a:pPr indent="0" lvl="0" marL="0" rtl="0" algn="l">
+              <a:spcBef>
+                <a:spcPts val="0"/>
+              </a:spcBef>
+              <a:spcAft>
+                <a:spcPts val="0"/>
+              </a:spcAft>
+              <a:buNone/>
+            </a:pPr>
+            <a:r>
+              <a:t/>
+            </a:r>
+            <a:endParaRPr/>
+          </a:p>
+        </p:txBody>
+      </p:sp>
+    </p:spTree>
+  </p:cSld>
+  <p:clrMapOvr>
+    <a:masterClrMapping/>
+  </p:clrMapOvr>
+</p:notes>
+</file>
+
+<file path=ppt/notesSlides/notesSlide8.xml><?xml version="1.0" encoding="utf-8"?>
+<p:notes xmlns:a="http://schemas.openxmlformats.org/drawingml/2006/main" xmlns:r="http://schemas.openxmlformats.org/officeDocument/2006/relationships" xmlns:mc="http://schemas.openxmlformats.org/markup-compatibility/2006" xmlns:mv="urn:schemas-microsoft-com:mac:vml" xmlns:p="http://schemas.openxmlformats.org/presentationml/2006/main" xmlns:c="http://schemas.openxmlformats.org/drawingml/2006/chart" xmlns:dgm="http://schemas.openxmlformats.org/drawingml/2006/diagram" xmlns:o="urn:schemas-microsoft-com:office:office" xmlns:v="urn:schemas-microsoft-com:vml" xmlns:pvml="urn:schemas-microsoft-com:office:powerpoint" xmlns:com="http://schemas.openxmlformats.org/drawingml/2006/compatibility" xmlns:p14="http://schemas.microsoft.com/office/powerpoint/2010/main" xmlns:p15="http://schemas.microsoft.com/office/powerpoint/2012/main" xmlns:ahyp="http://schemas.microsoft.com/office/drawing/2018/hyperlinkcolor" showMasterPhAnim="0" showMasterSp="0">
+  <p:cSld>
+    <p:spTree>
+      <p:nvGrpSpPr>
+        <p:cNvPr id="172" name="Shape 172"/>
+        <p:cNvGrpSpPr/>
+        <p:nvPr/>
+      </p:nvGrpSpPr>
+      <p:grpSpPr>
+        <a:xfrm>
+          <a:off x="0" y="0"/>
+          <a:ext cx="0" cy="0"/>
+          <a:chOff x="0" y="0"/>
+          <a:chExt cx="0" cy="0"/>
+        </a:xfrm>
+      </p:grpSpPr>
+      <p:sp>
+        <p:nvSpPr>
+          <p:cNvPr id="173" name="Google Shape;173;g2fa9c43fd8d_0_150:notes"/>
+          <p:cNvSpPr/>
+          <p:nvPr>
+            <p:ph idx="2" type="sldImg"/>
+          </p:nvPr>
+        </p:nvSpPr>
+        <p:spPr>
+          <a:xfrm>
+            <a:off x="381300" y="685800"/>
+            <a:ext cx="6096000" cy="3429000"/>
+          </a:xfrm>
+          <a:custGeom>
+            <a:rect b="b" l="l" r="r" t="t"/>
+            <a:pathLst>
+              <a:path extrusionOk="0" h="120000" w="120000">
+                <a:moveTo>
+                  <a:pt x="0" y="0"/>
+                </a:moveTo>
+                <a:lnTo>
+                  <a:pt x="120000" y="0"/>
+                </a:lnTo>
+                <a:lnTo>
+                  <a:pt x="120000" y="120000"/>
+                </a:lnTo>
+                <a:lnTo>
+                  <a:pt x="0" y="120000"/>
+                </a:lnTo>
+                <a:close/>
+              </a:path>
+            </a:pathLst>
+          </a:custGeom>
+        </p:spPr>
+      </p:sp>
+      <p:sp>
+        <p:nvSpPr>
+          <p:cNvPr id="174" name="Google Shape;174;g2fa9c43fd8d_0_150:notes"/>
           <p:cNvSpPr txBox="1"/>
           <p:nvPr>
             <p:ph idx="1" type="body"/>
@@ -9788,8 +9888,8 @@
         </p:nvSpPr>
         <p:spPr>
           <a:xfrm>
-            <a:off x="1297500" y="1567550"/>
-            <a:ext cx="7038900" cy="2911200"/>
+            <a:off x="568900" y="1567550"/>
+            <a:ext cx="8058300" cy="3209700"/>
           </a:xfrm>
           <a:prstGeom prst="rect">
             <a:avLst/>
@@ -9797,21 +9897,74 @@
         </p:spPr>
         <p:txBody>
           <a:bodyPr anchorCtr="0" anchor="t" bIns="91425" lIns="91425" spcFirstLastPara="1" rIns="91425" wrap="square" tIns="91425">
-            <a:normAutofit/>
+            <a:noAutofit/>
           </a:bodyPr>
           <a:lstStyle/>
           <a:p>
-            <a:pPr indent="0" lvl="0" marL="0" rtl="0" algn="l">
-              <a:spcBef>
-                <a:spcPts val="0"/>
-              </a:spcBef>
-              <a:spcAft>
-                <a:spcPts val="1200"/>
-              </a:spcAft>
-              <a:buNone/>
+            <a:pPr indent="-355600" lvl="0" marL="457200" rtl="0" algn="l">
+              <a:spcBef>
+                <a:spcPts val="0"/>
+              </a:spcBef>
+              <a:spcAft>
+                <a:spcPts val="0"/>
+              </a:spcAft>
+              <a:buSzPts val="2000"/>
+              <a:buChar char="●"/>
             </a:pPr>
             <a:r>
-              <a:t/>
+              <a:rPr lang="en" sz="2000"/>
+              <a:t>Is it possible to predict the runtime of a film based on its genre?</a:t>
+            </a:r>
+            <a:endParaRPr sz="2000"/>
+          </a:p>
+          <a:p>
+            <a:pPr indent="-355600" lvl="0" marL="457200" rtl="0" algn="l">
+              <a:spcBef>
+                <a:spcPts val="0"/>
+              </a:spcBef>
+              <a:spcAft>
+                <a:spcPts val="0"/>
+              </a:spcAft>
+              <a:buSzPts val="2000"/>
+              <a:buChar char="●"/>
+            </a:pPr>
+            <a:r>
+              <a:rPr lang="en" sz="2000"/>
+              <a:t>Is it possible to predict the runtime of a film based on its country of origin?</a:t>
+            </a:r>
+            <a:endParaRPr sz="2000"/>
+          </a:p>
+          <a:p>
+            <a:pPr indent="-355600" lvl="0" marL="457200" rtl="0" algn="l">
+              <a:spcBef>
+                <a:spcPts val="0"/>
+              </a:spcBef>
+              <a:spcAft>
+                <a:spcPts val="0"/>
+              </a:spcAft>
+              <a:buSzPts val="2000"/>
+              <a:buChar char="●"/>
+            </a:pPr>
+            <a:r>
+              <a:rPr lang="en" sz="2000"/>
+              <a:t>Is it possible to predict the runtime of a film based on its date of release?</a:t>
+            </a:r>
+            <a:endParaRPr sz="2000"/>
+          </a:p>
+          <a:p>
+            <a:pPr indent="-355600" lvl="0" marL="457200" rtl="0" algn="l">
+              <a:spcBef>
+                <a:spcPts val="0"/>
+              </a:spcBef>
+              <a:spcAft>
+                <a:spcPts val="0"/>
+              </a:spcAft>
+              <a:buSzPts val="2000"/>
+              <a:buChar char="●"/>
+            </a:pPr>
+            <a:r>
+              <a:rPr lang="en" sz="2000"/>
+              <a:t>Can an ideal film length (may be a range) be identified which corresponds to high ratings from viewers?</a:t>
             </a:r>
             <a:endParaRPr sz="2000"/>
           </a:p>
@@ -9905,17 +10058,78 @@
           </a:bodyPr>
           <a:lstStyle/>
           <a:p>
-            <a:pPr indent="0" lvl="0" marL="0" rtl="0" algn="l">
-              <a:spcBef>
-                <a:spcPts val="0"/>
-              </a:spcBef>
-              <a:spcAft>
-                <a:spcPts val="1200"/>
-              </a:spcAft>
-              <a:buNone/>
+            <a:pPr indent="-355600" lvl="0" marL="457200" rtl="0" algn="l">
+              <a:spcBef>
+                <a:spcPts val="0"/>
+              </a:spcBef>
+              <a:spcAft>
+                <a:spcPts val="0"/>
+              </a:spcAft>
+              <a:buSzPts val="2000"/>
+              <a:buChar char="●"/>
             </a:pPr>
             <a:r>
-              <a:t/>
+              <a:rPr lang="en" sz="2000"/>
+              <a:t>Outlier handling</a:t>
+            </a:r>
+            <a:endParaRPr sz="2000"/>
+          </a:p>
+          <a:p>
+            <a:pPr indent="-355600" lvl="0" marL="457200" rtl="0" algn="l">
+              <a:spcBef>
+                <a:spcPts val="0"/>
+              </a:spcBef>
+              <a:spcAft>
+                <a:spcPts val="0"/>
+              </a:spcAft>
+              <a:buSzPts val="2000"/>
+              <a:buChar char="●"/>
+            </a:pPr>
+            <a:r>
+              <a:rPr lang="en" sz="2000"/>
+              <a:t>Other data cleaning (removing </a:t>
+            </a:r>
+            <a:r>
+              <a:rPr lang="en" sz="2000"/>
+              <a:t>unnecessary</a:t>
+            </a:r>
+            <a:r>
+              <a:rPr lang="en" sz="2000"/>
+              <a:t> features, etc.)</a:t>
+            </a:r>
+            <a:endParaRPr sz="2000"/>
+          </a:p>
+          <a:p>
+            <a:pPr indent="-355600" lvl="0" marL="457200" rtl="0" algn="l">
+              <a:spcBef>
+                <a:spcPts val="0"/>
+              </a:spcBef>
+              <a:spcAft>
+                <a:spcPts val="0"/>
+              </a:spcAft>
+              <a:buSzPts val="2000"/>
+              <a:buChar char="●"/>
+            </a:pPr>
+            <a:r>
+              <a:rPr lang="en" sz="2000"/>
+              <a:t>Data integration</a:t>
+            </a:r>
+            <a:endParaRPr sz="2000"/>
+          </a:p>
+          <a:p>
+            <a:pPr indent="-355600" lvl="0" marL="457200" rtl="0" algn="l">
+              <a:spcBef>
+                <a:spcPts val="0"/>
+              </a:spcBef>
+              <a:spcAft>
+                <a:spcPts val="0"/>
+              </a:spcAft>
+              <a:buSzPts val="2000"/>
+              <a:buChar char="●"/>
+            </a:pPr>
+            <a:r>
+              <a:rPr lang="en" sz="2000"/>
+              <a:t>Data transformation (one-hot encoding, etc.)</a:t>
             </a:r>
             <a:endParaRPr sz="2000"/>
           </a:p>
@@ -10009,17 +10223,53 @@
           </a:bodyPr>
           <a:lstStyle/>
           <a:p>
-            <a:pPr indent="0" lvl="0" marL="0" rtl="0" algn="l">
-              <a:spcBef>
-                <a:spcPts val="0"/>
-              </a:spcBef>
-              <a:spcAft>
-                <a:spcPts val="1200"/>
-              </a:spcAft>
-              <a:buNone/>
+            <a:pPr indent="-355600" lvl="0" marL="457200" rtl="0" algn="l">
+              <a:spcBef>
+                <a:spcPts val="0"/>
+              </a:spcBef>
+              <a:spcAft>
+                <a:spcPts val="0"/>
+              </a:spcAft>
+              <a:buSzPts val="2000"/>
+              <a:buChar char="●"/>
             </a:pPr>
             <a:r>
-              <a:t/>
+              <a:rPr lang="en" sz="2000"/>
+              <a:t>Python</a:t>
+            </a:r>
+            <a:endParaRPr sz="2000"/>
+          </a:p>
+          <a:p>
+            <a:pPr indent="-355600" lvl="0" marL="457200" rtl="0" algn="l">
+              <a:spcBef>
+                <a:spcPts val="0"/>
+              </a:spcBef>
+              <a:spcAft>
+                <a:spcPts val="0"/>
+              </a:spcAft>
+              <a:buSzPts val="2000"/>
+              <a:buChar char="●"/>
+            </a:pPr>
+            <a:r>
+              <a:rPr lang="en" sz="2000"/>
+              <a:t>Data libraries: Pandas, NumPy, Pgmpy, Scikit-learn</a:t>
+            </a:r>
+            <a:endParaRPr sz="2000"/>
+          </a:p>
+          <a:p>
+            <a:pPr indent="-355600" lvl="0" marL="457200" rtl="0" algn="l">
+              <a:spcBef>
+                <a:spcPts val="0"/>
+              </a:spcBef>
+              <a:spcAft>
+                <a:spcPts val="0"/>
+              </a:spcAft>
+              <a:buSzPts val="2000"/>
+              <a:buChar char="●"/>
+            </a:pPr>
+            <a:r>
+              <a:rPr lang="en" sz="2000"/>
+              <a:t>Visualization libraries: Seaborn, Matplotlib</a:t>
             </a:r>
             <a:endParaRPr sz="2000"/>
           </a:p>
@@ -10084,7 +10334,7 @@
             </a:pPr>
             <a:r>
               <a:rPr lang="en" sz="4000"/>
-              <a:t>Classification/Clustering</a:t>
+              <a:t>Clustering</a:t>
             </a:r>
             <a:endParaRPr sz="4300"/>
           </a:p>
@@ -10118,12 +10368,81 @@
                 <a:spcPts val="0"/>
               </a:spcBef>
               <a:spcAft>
-                <a:spcPts val="1200"/>
+                <a:spcPts val="0"/>
               </a:spcAft>
               <a:buNone/>
             </a:pPr>
             <a:r>
-              <a:t/>
+              <a:rPr lang="en" sz="2000"/>
+              <a:t>Unsupervised learning techniques were used such as:</a:t>
+            </a:r>
+            <a:endParaRPr sz="2000"/>
+          </a:p>
+          <a:p>
+            <a:pPr indent="-355600" lvl="0" marL="457200" rtl="0" algn="l">
+              <a:spcBef>
+                <a:spcPts val="1200"/>
+              </a:spcBef>
+              <a:spcAft>
+                <a:spcPts val="0"/>
+              </a:spcAft>
+              <a:buSzPts val="2000"/>
+              <a:buChar char="●"/>
+            </a:pPr>
+            <a:r>
+              <a:rPr lang="en" sz="2000"/>
+              <a:t>Linear regression</a:t>
+            </a:r>
+            <a:endParaRPr sz="2000"/>
+          </a:p>
+          <a:p>
+            <a:pPr indent="-355600" lvl="0" marL="457200" rtl="0" algn="l">
+              <a:spcBef>
+                <a:spcPts val="0"/>
+              </a:spcBef>
+              <a:spcAft>
+                <a:spcPts val="0"/>
+              </a:spcAft>
+              <a:buSzPts val="2000"/>
+              <a:buChar char="●"/>
+            </a:pPr>
+            <a:r>
+              <a:rPr lang="en" sz="2000"/>
+              <a:t>Random forest regression</a:t>
+            </a:r>
+            <a:endParaRPr sz="2000"/>
+          </a:p>
+          <a:p>
+            <a:pPr indent="-355600" lvl="0" marL="457200" rtl="0" algn="l">
+              <a:spcBef>
+                <a:spcPts val="0"/>
+              </a:spcBef>
+              <a:spcAft>
+                <a:spcPts val="0"/>
+              </a:spcAft>
+              <a:buSzPts val="2000"/>
+              <a:buChar char="●"/>
+            </a:pPr>
+            <a:r>
+              <a:rPr lang="en" sz="2000"/>
+              <a:t>Support vector machines</a:t>
+            </a:r>
+            <a:endParaRPr sz="2000"/>
+          </a:p>
+          <a:p>
+            <a:pPr indent="-355600" lvl="0" marL="457200" rtl="0" algn="l">
+              <a:spcBef>
+                <a:spcPts val="0"/>
+              </a:spcBef>
+              <a:spcAft>
+                <a:spcPts val="0"/>
+              </a:spcAft>
+              <a:buSzPts val="2000"/>
+              <a:buChar char="●"/>
+            </a:pPr>
+            <a:r>
+              <a:rPr lang="en" sz="2000"/>
+              <a:t>Bayesian Belief Network (identify patterns and structures)</a:t>
             </a:r>
             <a:endParaRPr sz="2000"/>
           </a:p>
@@ -10173,7 +10492,7 @@
         </p:spPr>
         <p:txBody>
           <a:bodyPr anchorCtr="0" anchor="t" bIns="91425" lIns="91425" spcFirstLastPara="1" rIns="91425" wrap="square" tIns="91425">
-            <a:normAutofit/>
+            <a:noAutofit/>
           </a:bodyPr>
           <a:lstStyle/>
           <a:p>
@@ -10188,9 +10507,9 @@
             </a:pPr>
             <a:r>
               <a:rPr lang="en" sz="4000"/>
-              <a:t>Insights Gleaned</a:t>
+              <a:t>Classification</a:t>
             </a:r>
-            <a:endParaRPr sz="4000"/>
+            <a:endParaRPr sz="4300"/>
           </a:p>
         </p:txBody>
       </p:sp>
@@ -10222,12 +10541,47 @@
                 <a:spcPts val="0"/>
               </a:spcBef>
               <a:spcAft>
-                <a:spcPts val="1200"/>
+                <a:spcPts val="0"/>
               </a:spcAft>
               <a:buNone/>
             </a:pPr>
             <a:r>
-              <a:t/>
+              <a:rPr lang="en" sz="2000"/>
+              <a:t>Supervised learning techniques were used such as:</a:t>
+            </a:r>
+            <a:endParaRPr sz="2000"/>
+          </a:p>
+          <a:p>
+            <a:pPr indent="-355600" lvl="0" marL="457200" rtl="0" algn="l">
+              <a:spcBef>
+                <a:spcPts val="1200"/>
+              </a:spcBef>
+              <a:spcAft>
+                <a:spcPts val="0"/>
+              </a:spcAft>
+              <a:buSzPts val="2000"/>
+              <a:buChar char="●"/>
+            </a:pPr>
+            <a:r>
+              <a:rPr lang="en" sz="2000"/>
+              <a:t>Bayesian Belief Network (predict probability of class labels)</a:t>
+            </a:r>
+            <a:endParaRPr sz="2000"/>
+          </a:p>
+          <a:p>
+            <a:pPr indent="-355600" lvl="0" marL="457200" rtl="0" algn="l">
+              <a:spcBef>
+                <a:spcPts val="0"/>
+              </a:spcBef>
+              <a:spcAft>
+                <a:spcPts val="0"/>
+              </a:spcAft>
+              <a:buSzPts val="2000"/>
+              <a:buChar char="●"/>
+            </a:pPr>
+            <a:r>
+              <a:rPr lang="en" sz="2000"/>
+              <a:t>K-nearest neighbors</a:t>
             </a:r>
             <a:endParaRPr sz="2000"/>
           </a:p>
@@ -10292,9 +10646,9 @@
             </a:pPr>
             <a:r>
               <a:rPr lang="en" sz="4000"/>
-              <a:t>Application of Insights</a:t>
+              <a:t>Insights Gleaned</a:t>
             </a:r>
-            <a:endParaRPr sz="4100"/>
+            <a:endParaRPr sz="4000"/>
           </a:p>
         </p:txBody>
       </p:sp>
@@ -10331,7 +10685,121 @@
               <a:buNone/>
             </a:pPr>
             <a:r>
-              <a:t/>
+              <a:rPr lang="en" sz="2000"/>
+              <a:t>Runtime is an oft-overlooked </a:t>
+            </a:r>
+            <a:r>
+              <a:rPr lang="en" sz="2000"/>
+              <a:t>feature</a:t>
+            </a:r>
+            <a:r>
+              <a:rPr lang="en" sz="2000"/>
+              <a:t> of film analysis but can successfully be predicted by several other variables. Most notably, runtime can be predicted by rating, genre, country of origin, language, or studio. </a:t>
+            </a:r>
+            <a:endParaRPr sz="2000"/>
+          </a:p>
+        </p:txBody>
+      </p:sp>
+    </p:spTree>
+  </p:cSld>
+  <p:clrMapOvr>
+    <a:masterClrMapping/>
+  </p:clrMapOvr>
+</p:sld>
+</file>
+
+<file path=ppt/slides/slide8.xml><?xml version="1.0" encoding="utf-8"?>
+<p:sld xmlns:a="http://schemas.openxmlformats.org/drawingml/2006/main" xmlns:r="http://schemas.openxmlformats.org/officeDocument/2006/relationships" xmlns:mc="http://schemas.openxmlformats.org/markup-compatibility/2006" xmlns:mv="urn:schemas-microsoft-com:mac:vml" xmlns:p="http://schemas.openxmlformats.org/presentationml/2006/main" xmlns:c="http://schemas.openxmlformats.org/drawingml/2006/chart" xmlns:dgm="http://schemas.openxmlformats.org/drawingml/2006/diagram" xmlns:o="urn:schemas-microsoft-com:office:office" xmlns:v="urn:schemas-microsoft-com:vml" xmlns:pvml="urn:schemas-microsoft-com:office:powerpoint" xmlns:com="http://schemas.openxmlformats.org/drawingml/2006/compatibility" xmlns:p14="http://schemas.microsoft.com/office/powerpoint/2010/main" xmlns:p15="http://schemas.microsoft.com/office/powerpoint/2012/main" xmlns:ahyp="http://schemas.microsoft.com/office/drawing/2018/hyperlinkcolor">
+  <p:cSld>
+    <p:spTree>
+      <p:nvGrpSpPr>
+        <p:cNvPr id="175" name="Shape 175"/>
+        <p:cNvGrpSpPr/>
+        <p:nvPr/>
+      </p:nvGrpSpPr>
+      <p:grpSpPr>
+        <a:xfrm>
+          <a:off x="0" y="0"/>
+          <a:ext cx="0" cy="0"/>
+          <a:chOff x="0" y="0"/>
+          <a:chExt cx="0" cy="0"/>
+        </a:xfrm>
+      </p:grpSpPr>
+      <p:sp>
+        <p:nvSpPr>
+          <p:cNvPr id="176" name="Google Shape;176;p20"/>
+          <p:cNvSpPr txBox="1"/>
+          <p:nvPr>
+            <p:ph type="title"/>
+          </p:nvPr>
+        </p:nvSpPr>
+        <p:spPr>
+          <a:xfrm>
+            <a:off x="1297500" y="393750"/>
+            <a:ext cx="7038900" cy="914100"/>
+          </a:xfrm>
+          <a:prstGeom prst="rect">
+            <a:avLst/>
+          </a:prstGeom>
+        </p:spPr>
+        <p:txBody>
+          <a:bodyPr anchorCtr="0" anchor="t" bIns="91425" lIns="91425" spcFirstLastPara="1" rIns="91425" wrap="square" tIns="91425">
+            <a:normAutofit/>
+          </a:bodyPr>
+          <a:lstStyle/>
+          <a:p>
+            <a:pPr indent="0" lvl="0" marL="0" rtl="0" algn="l">
+              <a:spcBef>
+                <a:spcPts val="0"/>
+              </a:spcBef>
+              <a:spcAft>
+                <a:spcPts val="0"/>
+              </a:spcAft>
+              <a:buNone/>
+            </a:pPr>
+            <a:r>
+              <a:rPr lang="en" sz="4000"/>
+              <a:t>Application of Insights</a:t>
+            </a:r>
+            <a:endParaRPr sz="4100"/>
+          </a:p>
+        </p:txBody>
+      </p:sp>
+      <p:sp>
+        <p:nvSpPr>
+          <p:cNvPr id="177" name="Google Shape;177;p20"/>
+          <p:cNvSpPr txBox="1"/>
+          <p:nvPr>
+            <p:ph idx="1" type="body"/>
+          </p:nvPr>
+        </p:nvSpPr>
+        <p:spPr>
+          <a:xfrm>
+            <a:off x="1297500" y="1567550"/>
+            <a:ext cx="7038900" cy="2911200"/>
+          </a:xfrm>
+          <a:prstGeom prst="rect">
+            <a:avLst/>
+          </a:prstGeom>
+        </p:spPr>
+        <p:txBody>
+          <a:bodyPr anchorCtr="0" anchor="t" bIns="91425" lIns="91425" spcFirstLastPara="1" rIns="91425" wrap="square" tIns="91425">
+            <a:normAutofit/>
+          </a:bodyPr>
+          <a:lstStyle/>
+          <a:p>
+            <a:pPr indent="0" lvl="0" marL="0" rtl="0" algn="l">
+              <a:spcBef>
+                <a:spcPts val="0"/>
+              </a:spcBef>
+              <a:spcAft>
+                <a:spcPts val="1200"/>
+              </a:spcAft>
+              <a:buNone/>
+            </a:pPr>
+            <a:r>
+              <a:rPr lang="en" sz="2000"/>
+              <a:t>These insights can be brought to bear by the film industry to craft films more likely to be resonant or successful to target audiences, or more likely to bring in targeted ratings or box office take. </a:t>
             </a:r>
             <a:endParaRPr sz="2000"/>
           </a:p>

</xml_diff>